<commit_message>
peach-fy network policy demo
</commit_message>
<xml_diff>
--- a/kubernetes/11_2_security.pptx
+++ b/kubernetes/11_2_security.pptx
@@ -2396,7 +2396,7 @@
         <p:spPr/>
         <p:txBody>
           <a:bodyPr>
-            <a:normAutofit fontScale="92500" lnSpcReduction="20000"/>
+            <a:normAutofit fontScale="92500" lnSpcReduction="10000"/>
           </a:bodyPr>
           <a:lstStyle/>
           <a:p>
@@ -2411,16 +2411,20 @@
               <a:buChar char="-"/>
             </a:pPr>
             <a:r>
+              <a:rPr lang="de-DE" dirty="0" err="1"/>
+              <a:t>Createa</a:t>
+            </a:r>
+            <a:r>
               <a:rPr lang="de-DE" dirty="0"/>
-              <a:t>Create a </a:t>
+              <a:t> a </a:t>
             </a:r>
             <a:r>
               <a:rPr lang="de-DE" dirty="0" err="1"/>
-              <a:t>deployment</a:t>
+              <a:t>peach-pod</a:t>
             </a:r>
             <a:r>
               <a:rPr lang="de-DE" dirty="0"/>
-              <a:t> &amp; a </a:t>
+              <a:t> and </a:t>
             </a:r>
             <a:r>
               <a:rPr lang="de-DE" dirty="0" err="1"/>
@@ -2434,34 +2438,7 @@
               <a:rPr lang="de-DE" dirty="0" err="1"/>
               <a:t>service</a:t>
             </a:r>
-            <a:r>
-              <a:rPr lang="de-DE" dirty="0"/>
-              <a:t> (</a:t>
-            </a:r>
-            <a:r>
-              <a:rPr lang="de-DE" dirty="0" err="1"/>
-              <a:t>if</a:t>
-            </a:r>
-            <a:r>
-              <a:rPr lang="de-DE" dirty="0"/>
-              <a:t> not </a:t>
-            </a:r>
-            <a:r>
-              <a:rPr lang="de-DE" dirty="0" err="1"/>
-              <a:t>yet</a:t>
-            </a:r>
-            <a:r>
-              <a:rPr lang="de-DE" dirty="0"/>
-              <a:t> </a:t>
-            </a:r>
-            <a:r>
-              <a:rPr lang="de-DE" dirty="0" err="1"/>
-              <a:t>done</a:t>
-            </a:r>
-            <a:r>
-              <a:rPr lang="de-DE" dirty="0"/>
-              <a:t>)</a:t>
-            </a:r>
+            <a:endParaRPr lang="de-DE" dirty="0"/>
           </a:p>
           <a:p>
             <a:pPr marL="465750" lvl="1" indent="-285750">
@@ -2478,94 +2455,17 @@
             </a:r>
             <a:r>
               <a:rPr lang="de-DE" dirty="0" err="1"/>
-              <a:t>run</a:t>
+              <a:t>apply</a:t>
             </a:r>
             <a:r>
               <a:rPr lang="de-DE" dirty="0"/>
-              <a:t> </a:t>
-            </a:r>
-            <a:r>
-              <a:rPr lang="de-DE" dirty="0" err="1"/>
-              <a:t>nginx</a:t>
-            </a:r>
-            <a:r>
-              <a:rPr lang="de-DE" dirty="0"/>
-              <a:t> --image</a:t>
-            </a:r>
-            <a:r>
-              <a:rPr lang="de-DE" b="1" dirty="0"/>
-              <a:t>=</a:t>
-            </a:r>
-            <a:r>
-              <a:rPr lang="de-DE" dirty="0" err="1"/>
-              <a:t>nginx</a:t>
-            </a:r>
-            <a:r>
-              <a:rPr lang="de-DE" dirty="0"/>
-              <a:t> --</a:t>
-            </a:r>
-            <a:r>
-              <a:rPr lang="de-DE" dirty="0" err="1"/>
-              <a:t>replicas</a:t>
-            </a:r>
-            <a:r>
-              <a:rPr lang="de-DE" b="1" dirty="0"/>
-              <a:t>=</a:t>
-            </a:r>
-            <a:r>
-              <a:rPr lang="de-DE" dirty="0"/>
-              <a:t>2 </a:t>
-            </a:r>
-          </a:p>
-          <a:p>
-            <a:pPr marL="465750" lvl="1" indent="-285750">
-              <a:buFont typeface="Symbol" panose="05050102010706020507" pitchFamily="18" charset="2"/>
-              <a:buChar char="-"/>
-            </a:pPr>
-            <a:r>
-              <a:rPr lang="de-DE" dirty="0" err="1"/>
-              <a:t>kubectl</a:t>
-            </a:r>
-            <a:r>
-              <a:rPr lang="de-DE" dirty="0"/>
-              <a:t> </a:t>
-            </a:r>
-            <a:r>
-              <a:rPr lang="de-DE" dirty="0" err="1"/>
-              <a:t>expose</a:t>
-            </a:r>
-            <a:r>
-              <a:rPr lang="de-DE" dirty="0"/>
-              <a:t> </a:t>
-            </a:r>
-            <a:r>
-              <a:rPr lang="de-DE" dirty="0" err="1"/>
-              <a:t>deployment</a:t>
-            </a:r>
-            <a:r>
-              <a:rPr lang="de-DE" dirty="0"/>
-              <a:t> </a:t>
-            </a:r>
-            <a:r>
-              <a:rPr lang="de-DE" dirty="0" err="1"/>
-              <a:t>nginx</a:t>
-            </a:r>
-            <a:r>
-              <a:rPr lang="de-DE" dirty="0"/>
-              <a:t> --</a:t>
-            </a:r>
-            <a:r>
-              <a:rPr lang="de-DE" dirty="0" err="1"/>
-              <a:t>port</a:t>
-            </a:r>
-            <a:r>
-              <a:rPr lang="de-DE" b="1" dirty="0"/>
-              <a:t>=</a:t>
-            </a:r>
-            <a:r>
-              <a:rPr lang="de-DE" dirty="0"/>
-              <a:t>80</a:t>
-            </a:r>
+              <a:t> –f </a:t>
+            </a:r>
+            <a:r>
+              <a:rPr lang="en-US" dirty="0"/>
+              <a:t>11_network_policy_resources.yaml</a:t>
+            </a:r>
+            <a:endParaRPr lang="de-DE" dirty="0"/>
           </a:p>
           <a:p>
             <a:pPr marL="285750" indent="-285750">
@@ -2645,31 +2545,7 @@
             </a:r>
             <a:r>
               <a:rPr lang="de-DE" dirty="0"/>
-              <a:t> </a:t>
-            </a:r>
-            <a:r>
-              <a:rPr lang="de-DE" dirty="0" err="1"/>
-              <a:t>from</a:t>
-            </a:r>
-            <a:r>
-              <a:rPr lang="de-DE" dirty="0"/>
-              <a:t> </a:t>
-            </a:r>
-            <a:r>
-              <a:rPr lang="de-DE" dirty="0" err="1"/>
-              <a:t>the</a:t>
-            </a:r>
-            <a:r>
-              <a:rPr lang="de-DE" dirty="0"/>
-              <a:t> </a:t>
-            </a:r>
-            <a:r>
-              <a:rPr lang="de-DE" dirty="0" err="1"/>
-              <a:t>nginx</a:t>
-            </a:r>
-            <a:r>
-              <a:rPr lang="de-DE" dirty="0"/>
-              <a:t> backend.</a:t>
+              <a:t>.</a:t>
             </a:r>
           </a:p>
           <a:p>
@@ -2678,61 +2554,122 @@
               <a:buChar char="-"/>
             </a:pPr>
             <a:r>
-              <a:rPr lang="de-DE" dirty="0" err="1"/>
+              <a:rPr lang="en-US" sz="1400" b="0" i="0" kern="1200" dirty="0" err="1">
+                <a:solidFill>
+                  <a:schemeClr val="tx1"/>
+                </a:solidFill>
+                <a:effectLst/>
+                <a:latin typeface="+mn-lt"/>
+                <a:ea typeface="+mn-ea"/>
+                <a:cs typeface="+mn-cs"/>
+              </a:rPr>
               <a:t>kubectl</a:t>
             </a:r>
             <a:r>
-              <a:rPr lang="de-DE" dirty="0"/>
-              <a:t> </a:t>
-            </a:r>
-            <a:r>
-              <a:rPr lang="de-DE" dirty="0" err="1"/>
-              <a:t>run</a:t>
-            </a:r>
-            <a:r>
-              <a:rPr lang="de-DE" dirty="0"/>
-              <a:t> </a:t>
-            </a:r>
-            <a:r>
-              <a:rPr lang="de-DE" dirty="0" err="1"/>
-              <a:t>connector</a:t>
-            </a:r>
-            <a:r>
-              <a:rPr lang="de-DE" dirty="0"/>
+              <a:rPr lang="en-US" sz="1400" b="0" i="0" kern="1200" dirty="0">
+                <a:solidFill>
+                  <a:schemeClr val="tx1"/>
+                </a:solidFill>
+                <a:effectLst/>
+                <a:latin typeface="+mn-lt"/>
+                <a:ea typeface="+mn-ea"/>
+                <a:cs typeface="+mn-cs"/>
+              </a:rPr>
+              <a:t> run </a:t>
+            </a:r>
+            <a:r>
+              <a:rPr lang="en-US" sz="1400" b="0" i="0" kern="1200" dirty="0" err="1">
+                <a:solidFill>
+                  <a:schemeClr val="tx1"/>
+                </a:solidFill>
+                <a:effectLst/>
+                <a:latin typeface="+mn-lt"/>
+                <a:ea typeface="+mn-ea"/>
+                <a:cs typeface="+mn-cs"/>
+              </a:rPr>
+              <a:t>mario</a:t>
+            </a:r>
+            <a:r>
+              <a:rPr lang="en-US" sz="1400" b="0" i="0" kern="1200" dirty="0">
+                <a:solidFill>
+                  <a:schemeClr val="tx1"/>
+                </a:solidFill>
+                <a:effectLst/>
+                <a:latin typeface="+mn-lt"/>
+                <a:ea typeface="+mn-ea"/>
+                <a:cs typeface="+mn-cs"/>
+              </a:rPr>
+              <a:t> --generator=run-pod/v1 -</a:t>
+            </a:r>
+            <a:r>
+              <a:rPr lang="en-US" sz="1400" b="0" i="0" kern="1200" dirty="0" err="1">
+                <a:solidFill>
+                  <a:schemeClr val="tx1"/>
+                </a:solidFill>
+                <a:effectLst/>
+                <a:latin typeface="+mn-lt"/>
+                <a:ea typeface="+mn-ea"/>
+                <a:cs typeface="+mn-cs"/>
+              </a:rPr>
+              <a:t>i</a:t>
+            </a:r>
+            <a:r>
+              <a:rPr lang="en-US" sz="1400" b="0" i="0" kern="1200" dirty="0">
+                <a:solidFill>
+                  <a:schemeClr val="tx1"/>
+                </a:solidFill>
+                <a:effectLst/>
+                <a:latin typeface="+mn-lt"/>
+                <a:ea typeface="+mn-ea"/>
+                <a:cs typeface="+mn-cs"/>
+              </a:rPr>
               <a:t> --</a:t>
             </a:r>
             <a:r>
-              <a:rPr lang="de-DE" dirty="0" err="1"/>
-              <a:t>rm</a:t>
-            </a:r>
-            <a:r>
-              <a:rPr lang="de-DE" dirty="0"/>
-              <a:t> -</a:t>
-            </a:r>
-            <a:r>
-              <a:rPr lang="de-DE" dirty="0" err="1"/>
-              <a:t>ti</a:t>
-            </a:r>
-            <a:r>
-              <a:rPr lang="de-DE" dirty="0"/>
-              <a:t> --</a:t>
-            </a:r>
-            <a:r>
-              <a:rPr lang="de-DE" dirty="0" err="1"/>
-              <a:t>restart</a:t>
-            </a:r>
-            <a:r>
-              <a:rPr lang="de-DE" dirty="0"/>
-              <a:t>=Never --image</a:t>
-            </a:r>
-            <a:r>
-              <a:rPr lang="de-DE" b="1" dirty="0"/>
-              <a:t>=</a:t>
-            </a:r>
-            <a:r>
-              <a:rPr lang="de-DE" dirty="0"/>
-              <a:t>alpine:3.8</a:t>
-            </a:r>
+              <a:rPr lang="en-US" sz="1400" b="0" i="0" kern="1200" dirty="0" err="1">
+                <a:solidFill>
+                  <a:schemeClr val="tx1"/>
+                </a:solidFill>
+                <a:effectLst/>
+                <a:latin typeface="+mn-lt"/>
+                <a:ea typeface="+mn-ea"/>
+                <a:cs typeface="+mn-cs"/>
+              </a:rPr>
+              <a:t>tty</a:t>
+            </a:r>
+            <a:r>
+              <a:rPr lang="en-US" sz="1400" b="0" i="0" kern="1200" dirty="0">
+                <a:solidFill>
+                  <a:schemeClr val="tx1"/>
+                </a:solidFill>
+                <a:effectLst/>
+                <a:latin typeface="+mn-lt"/>
+                <a:ea typeface="+mn-ea"/>
+                <a:cs typeface="+mn-cs"/>
+              </a:rPr>
+              <a:t> --restart=Never --rm --image=alpine:3.8 /bin/</a:t>
+            </a:r>
+            <a:r>
+              <a:rPr lang="en-US" sz="1400" b="0" i="0" kern="1200" dirty="0" err="1">
+                <a:solidFill>
+                  <a:schemeClr val="tx1"/>
+                </a:solidFill>
+                <a:effectLst/>
+                <a:latin typeface="+mn-lt"/>
+                <a:ea typeface="+mn-ea"/>
+                <a:cs typeface="+mn-cs"/>
+              </a:rPr>
+              <a:t>sh</a:t>
+            </a:r>
+            <a:endParaRPr lang="en-US" sz="1400" b="0" i="0" kern="1200" dirty="0">
+              <a:solidFill>
+                <a:schemeClr val="tx1"/>
+              </a:solidFill>
+              <a:effectLst/>
+              <a:latin typeface="+mn-lt"/>
+              <a:ea typeface="+mn-ea"/>
+              <a:cs typeface="+mn-cs"/>
+            </a:endParaRPr>
           </a:p>
           <a:p>
             <a:pPr marL="465750" lvl="1" indent="-285750">
@@ -2749,115 +2686,29 @@
             </a:r>
             <a:r>
               <a:rPr lang="de-DE" dirty="0"/>
-              <a:t> --timeout=1 </a:t>
+              <a:t> --timeout=1 -q -O </a:t>
             </a:r>
             <a:r>
               <a:rPr lang="de-DE" dirty="0" err="1"/>
-              <a:t>nginx</a:t>
+              <a:t>direct</a:t>
+            </a:r>
+            <a:r>
+              <a:rPr lang="de-DE" dirty="0"/>
+              <a:t>-line-</a:t>
+            </a:r>
+            <a:r>
+              <a:rPr lang="de-DE" dirty="0" err="1"/>
+              <a:t>to</a:t>
+            </a:r>
+            <a:r>
+              <a:rPr lang="de-DE" dirty="0"/>
+              <a:t>-</a:t>
+            </a:r>
+            <a:r>
+              <a:rPr lang="de-DE" dirty="0" err="1"/>
+              <a:t>peach</a:t>
             </a:r>
             <a:endParaRPr lang="de-DE" dirty="0"/>
-          </a:p>
-          <a:p>
-            <a:pPr marL="465750" lvl="1" indent="-285750">
-              <a:buFont typeface="Symbol" panose="05050102010706020507" pitchFamily="18" charset="2"/>
-              <a:buChar char="-"/>
-            </a:pPr>
-            <a:r>
-              <a:rPr lang="en-US" dirty="0"/>
-              <a:t>Remove the index.html page &amp; stay connected to the shell session</a:t>
-            </a:r>
-          </a:p>
-          <a:p>
-            <a:pPr marL="285750" indent="-285750">
-              <a:buFont typeface="Symbol" panose="05050102010706020507" pitchFamily="18" charset="2"/>
-              <a:buChar char="-"/>
-            </a:pPr>
-            <a:endParaRPr lang="en-US" dirty="0"/>
-          </a:p>
-          <a:p>
-            <a:pPr marL="285750" indent="-285750">
-              <a:buFont typeface="Symbol" panose="05050102010706020507" pitchFamily="18" charset="2"/>
-              <a:buChar char="-"/>
-            </a:pPr>
-            <a:r>
-              <a:rPr lang="en-US" dirty="0"/>
-              <a:t>Create the network policy in a 2</a:t>
-            </a:r>
-            <a:r>
-              <a:rPr lang="en-US" baseline="30000" dirty="0"/>
-              <a:t>nd</a:t>
-            </a:r>
-            <a:r>
-              <a:rPr lang="en-US" dirty="0"/>
-              <a:t> shell:</a:t>
-            </a:r>
-          </a:p>
-          <a:p>
-            <a:pPr marL="465750" lvl="1" indent="-285750">
-              <a:buFont typeface="Symbol" panose="05050102010706020507" pitchFamily="18" charset="2"/>
-              <a:buChar char="-"/>
-            </a:pPr>
-            <a:r>
-              <a:rPr lang="en-US" dirty="0" err="1"/>
-              <a:t>kubectl</a:t>
-            </a:r>
-            <a:r>
-              <a:rPr lang="en-US" dirty="0"/>
-              <a:t> create –f network-</a:t>
-            </a:r>
-            <a:r>
-              <a:rPr lang="en-US" dirty="0" err="1"/>
-              <a:t>policy.yaml</a:t>
-            </a:r>
-            <a:endParaRPr lang="en-US" dirty="0"/>
-          </a:p>
-          <a:p>
-            <a:pPr marL="465750" lvl="1" indent="-285750">
-              <a:buFont typeface="Symbol" panose="05050102010706020507" pitchFamily="18" charset="2"/>
-              <a:buChar char="-"/>
-            </a:pPr>
-            <a:r>
-              <a:rPr lang="en-US" dirty="0"/>
-              <a:t>Show the network policy definition and explain:</a:t>
-            </a:r>
-          </a:p>
-          <a:p>
-            <a:pPr marL="645750" lvl="2" indent="-285750">
-              <a:buFont typeface="Symbol" panose="05050102010706020507" pitchFamily="18" charset="2"/>
-              <a:buChar char="-"/>
-            </a:pPr>
-            <a:r>
-              <a:rPr lang="en-US" dirty="0"/>
-              <a:t>it’s implicitly a whitelisting</a:t>
-            </a:r>
-          </a:p>
-          <a:p>
-            <a:pPr marL="645750" lvl="2" indent="-285750">
-              <a:buFont typeface="Symbol" panose="05050102010706020507" pitchFamily="18" charset="2"/>
-              <a:buChar char="-"/>
-            </a:pPr>
-            <a:r>
-              <a:rPr lang="en-US" dirty="0"/>
-              <a:t>network policy can handle egress and ingress traffic. However the example is only of incoming (ingress) traffic.</a:t>
-            </a:r>
-          </a:p>
-          <a:p>
-            <a:pPr marL="645750" lvl="2" indent="-285750">
-              <a:buFont typeface="Symbol" panose="05050102010706020507" pitchFamily="18" charset="2"/>
-              <a:buChar char="-"/>
-            </a:pPr>
-            <a:r>
-              <a:rPr lang="en-US" dirty="0"/>
-              <a:t>The </a:t>
-            </a:r>
-            <a:r>
-              <a:rPr lang="en-US" dirty="0" err="1"/>
-              <a:t>cidr</a:t>
-            </a:r>
-            <a:r>
-              <a:rPr lang="en-US" dirty="0"/>
-              <a:t> block are required, if you want to access your service later from SAP networks. Otherwise all requested without the label (i.e. not cluster internal) will be blocked too.</a:t>
-            </a:r>
           </a:p>
           <a:p>
             <a:pPr marL="465750" lvl="1" indent="-285750">
@@ -2873,22 +2724,84 @@
             </a:pPr>
             <a:r>
               <a:rPr lang="en-US" dirty="0"/>
-              <a:t>Switch back to the helper pod and re-run the </a:t>
-            </a:r>
+              <a:t>Create the network policy in a 2</a:t>
+            </a:r>
+            <a:r>
+              <a:rPr lang="en-US" baseline="30000" dirty="0"/>
+              <a:t>nd</a:t>
+            </a:r>
+            <a:r>
+              <a:rPr lang="en-US" dirty="0"/>
+              <a:t> shell:</a:t>
+            </a:r>
+          </a:p>
+          <a:p>
+            <a:pPr marL="465750" lvl="1" indent="-285750">
+              <a:buFont typeface="Symbol" panose="05050102010706020507" pitchFamily="18" charset="2"/>
+              <a:buChar char="-"/>
+            </a:pPr>
             <a:r>
               <a:rPr lang="en-US" dirty="0" err="1"/>
-              <a:t>wget</a:t>
+              <a:t>kubectl</a:t>
             </a:r>
             <a:r>
               <a:rPr lang="en-US" dirty="0"/>
-              <a:t> command </a:t>
-            </a:r>
-            <a:r>
-              <a:rPr lang="en-US" dirty="0">
-                <a:sym typeface="Wingdings" panose="05000000000000000000" pitchFamily="2" charset="2"/>
-              </a:rPr>
-              <a:t> expected result: failure due to the missing label</a:t>
-            </a:r>
+              <a:t> create -f 11c_network_policy_ingress.yaml</a:t>
+            </a:r>
+          </a:p>
+          <a:p>
+            <a:pPr marL="465750" lvl="1" indent="-285750">
+              <a:buFont typeface="Symbol" panose="05050102010706020507" pitchFamily="18" charset="2"/>
+              <a:buChar char="-"/>
+            </a:pPr>
+            <a:r>
+              <a:rPr lang="en-US" dirty="0"/>
+              <a:t>Show the network policy definition and explain:</a:t>
+            </a:r>
+          </a:p>
+          <a:p>
+            <a:pPr marL="645750" lvl="2" indent="-285750">
+              <a:buFont typeface="Symbol" panose="05050102010706020507" pitchFamily="18" charset="2"/>
+              <a:buChar char="-"/>
+            </a:pPr>
+            <a:r>
+              <a:rPr lang="en-US" dirty="0"/>
+              <a:t>it’s implicitly a whitelisting</a:t>
+            </a:r>
+          </a:p>
+          <a:p>
+            <a:pPr marL="645750" lvl="2" indent="-285750">
+              <a:buFont typeface="Symbol" panose="05050102010706020507" pitchFamily="18" charset="2"/>
+              <a:buChar char="-"/>
+            </a:pPr>
+            <a:r>
+              <a:rPr lang="en-US" dirty="0"/>
+              <a:t>network policy can handle egress and ingress traffic. However the example is only of incoming (ingress) traffic.</a:t>
+            </a:r>
+          </a:p>
+          <a:p>
+            <a:pPr marL="645750" lvl="2" indent="-285750">
+              <a:buFont typeface="Symbol" panose="05050102010706020507" pitchFamily="18" charset="2"/>
+              <a:buChar char="-"/>
+            </a:pPr>
+            <a:r>
+              <a:rPr lang="en-US" dirty="0"/>
+              <a:t>The </a:t>
+            </a:r>
+            <a:r>
+              <a:rPr lang="en-US" dirty="0" err="1"/>
+              <a:t>cidr</a:t>
+            </a:r>
+            <a:r>
+              <a:rPr lang="en-US" dirty="0"/>
+              <a:t> block are required, if you want to access your service later from SAP networks. Otherwise all requested without the label (i.e. not cluster internal) will be blocked too.</a:t>
+            </a:r>
+          </a:p>
+          <a:p>
+            <a:pPr marL="465750" lvl="1" indent="-285750">
+              <a:buFont typeface="Symbol" panose="05050102010706020507" pitchFamily="18" charset="2"/>
+              <a:buChar char="-"/>
+            </a:pPr>
             <a:endParaRPr lang="en-US" dirty="0"/>
           </a:p>
           <a:p>
@@ -2898,6 +2811,31 @@
             </a:pPr>
             <a:r>
               <a:rPr lang="en-US" dirty="0"/>
+              <a:t>Switch back to the helper pod and re-run the </a:t>
+            </a:r>
+            <a:r>
+              <a:rPr lang="en-US" dirty="0" err="1"/>
+              <a:t>wget</a:t>
+            </a:r>
+            <a:r>
+              <a:rPr lang="en-US" dirty="0"/>
+              <a:t> command </a:t>
+            </a:r>
+            <a:r>
+              <a:rPr lang="en-US" dirty="0">
+                <a:sym typeface="Wingdings" panose="05000000000000000000" pitchFamily="2" charset="2"/>
+              </a:rPr>
+              <a:t> expected result: failure due to the missing label</a:t>
+            </a:r>
+            <a:endParaRPr lang="en-US" dirty="0"/>
+          </a:p>
+          <a:p>
+            <a:pPr marL="285750" indent="-285750">
+              <a:buFont typeface="Symbol" panose="05050102010706020507" pitchFamily="18" charset="2"/>
+              <a:buChar char="-"/>
+            </a:pPr>
+            <a:r>
+              <a:rPr lang="en-US" dirty="0"/>
               <a:t>Label you helper pod accordingly (can be done from the 2</a:t>
             </a:r>
             <a:r>
@@ -2920,8 +2858,21 @@
             </a:r>
             <a:r>
               <a:rPr lang="en-US" dirty="0"/>
-              <a:t> label pod connector access=true</a:t>
-            </a:r>
+              <a:t> label pod </a:t>
+            </a:r>
+            <a:r>
+              <a:rPr lang="en-US" dirty="0" err="1"/>
+              <a:t>marion</a:t>
+            </a:r>
+            <a:r>
+              <a:rPr lang="en-US" dirty="0"/>
+              <a:t> caller=</a:t>
+            </a:r>
+            <a:r>
+              <a:rPr lang="en-US"/>
+              <a:t>mario</a:t>
+            </a:r>
+            <a:endParaRPr lang="en-US" dirty="0"/>
           </a:p>
           <a:p>
             <a:pPr marL="285750" lvl="0" indent="-285750">

</xml_diff>

<commit_message>
update link to repo for demo
</commit_message>
<xml_diff>
--- a/kubernetes/11_2_security.pptx
+++ b/kubernetes/11_2_security.pptx
@@ -2661,8 +2661,19 @@
             </a:pPr>
             <a:r>
               <a:rPr lang="en-US" dirty="0"/>
-              <a:t>To demonstrate scenario #2, we prepared a separate repo: https://github.wdf.sap.corp/ps-container/host-fs-access-hack </a:t>
-            </a:r>
+              <a:t>To demonstrate scenario #2, we prepared a separate repo: </a:t>
+            </a:r>
+            <a:r>
+              <a:rPr lang="de-DE">
+                <a:hlinkClick r:id="rId3"/>
+              </a:rPr>
+              <a:t>https://github.wdf.sap.corp/slvi/host-fs-access-hack</a:t>
+            </a:r>
+            <a:r>
+              <a:rPr lang="en-US"/>
+              <a:t> </a:t>
+            </a:r>
+            <a:endParaRPr lang="en-US" dirty="0"/>
           </a:p>
           <a:p>
             <a:pPr marL="0" lvl="0" indent="0">
@@ -5280,7 +5291,7 @@
   <p:clrMapOvr>
     <a:masterClrMapping/>
   </p:clrMapOvr>
-  <p:extLst mod="1">
+  <p:extLst>
     <p:ext uri="{DCECCB84-F9BA-43D5-87BE-67443E8EF086}">
       <p15:sldGuideLst xmlns:p15="http://schemas.microsoft.com/office/powerpoint/2012/main"/>
     </p:ext>
@@ -8171,7 +8182,7 @@
   <p:clrMapOvr>
     <a:masterClrMapping/>
   </p:clrMapOvr>
-  <p:extLst mod="1">
+  <p:extLst>
     <p:ext uri="{DCECCB84-F9BA-43D5-87BE-67443E8EF086}">
       <p15:sldGuideLst xmlns:p15="http://schemas.microsoft.com/office/powerpoint/2012/main"/>
     </p:ext>
@@ -8348,7 +8359,7 @@
   <p:clrMapOvr>
     <a:masterClrMapping/>
   </p:clrMapOvr>
-  <p:extLst mod="1">
+  <p:extLst>
     <p:ext uri="{DCECCB84-F9BA-43D5-87BE-67443E8EF086}">
       <p15:sldGuideLst xmlns:p15="http://schemas.microsoft.com/office/powerpoint/2012/main"/>
     </p:ext>
@@ -16145,7 +16156,7 @@
   <p:clrMapOvr>
     <a:masterClrMapping/>
   </p:clrMapOvr>
-  <p:extLst mod="1">
+  <p:extLst>
     <p:ext uri="{DCECCB84-F9BA-43D5-87BE-67443E8EF086}">
       <p15:sldGuideLst xmlns:p15="http://schemas.microsoft.com/office/powerpoint/2012/main"/>
     </p:ext>
@@ -16570,7 +16581,7 @@
   <p:clrMapOvr>
     <a:masterClrMapping/>
   </p:clrMapOvr>
-  <p:extLst mod="1">
+  <p:extLst>
     <p:ext uri="{DCECCB84-F9BA-43D5-87BE-67443E8EF086}">
       <p15:sldGuideLst xmlns:p15="http://schemas.microsoft.com/office/powerpoint/2012/main"/>
     </p:ext>
@@ -17926,7 +17937,7 @@
       </a:lvl9pPr>
     </p:otherStyle>
   </p:txStyles>
-  <p:extLst mod="1">
+  <p:extLst>
     <p:ext uri="{27BBF7A9-308A-43DC-89C8-2F10F3537804}">
       <p15:sldGuideLst xmlns:p15="http://schemas.microsoft.com/office/powerpoint/2012/main"/>
     </p:ext>

</xml_diff>